<commit_message>
Home screen je linkovan, samo sastanci nisu
</commit_message>
<xml_diff>
--- a/Dokumentacija/Tim za SWE - Portal studentske organizacije.pptx
+++ b/Dokumentacija/Tim za SWE - Portal studentske organizacije.pptx
@@ -9,13 +9,14 @@
     <p:sldId id="266" r:id="rId3"/>
     <p:sldId id="267" r:id="rId4"/>
     <p:sldId id="275" r:id="rId5"/>
-    <p:sldId id="268" r:id="rId6"/>
-    <p:sldId id="269" r:id="rId7"/>
-    <p:sldId id="271" r:id="rId8"/>
+    <p:sldId id="269" r:id="rId6"/>
+    <p:sldId id="268" r:id="rId7"/>
+    <p:sldId id="277" r:id="rId8"/>
     <p:sldId id="272" r:id="rId9"/>
-    <p:sldId id="273" r:id="rId10"/>
-    <p:sldId id="274" r:id="rId11"/>
-    <p:sldId id="276" r:id="rId12"/>
+    <p:sldId id="271" r:id="rId10"/>
+    <p:sldId id="273" r:id="rId11"/>
+    <p:sldId id="274" r:id="rId12"/>
+    <p:sldId id="276" r:id="rId13"/>
   </p:sldIdLst>
   <p:sldSz cx="12192000" cy="6858000"/>
   <p:notesSz cx="6858000" cy="9144000"/>
@@ -253,7 +254,7 @@
           <a:p>
             <a:fld id="{82653990-E29F-4583-B3DF-16019A14CFE6}" type="datetimeFigureOut">
               <a:rPr lang="sr-Latn-RS" smtClean="0"/>
-              <a:t>26.6.2016.</a:t>
+              <a:t>27.6.2016.</a:t>
             </a:fld>
             <a:endParaRPr lang="sr-Latn-RS"/>
           </a:p>
@@ -423,7 +424,7 @@
           <a:p>
             <a:fld id="{82653990-E29F-4583-B3DF-16019A14CFE6}" type="datetimeFigureOut">
               <a:rPr lang="sr-Latn-RS" smtClean="0"/>
-              <a:t>26.6.2016.</a:t>
+              <a:t>27.6.2016.</a:t>
             </a:fld>
             <a:endParaRPr lang="sr-Latn-RS"/>
           </a:p>
@@ -603,7 +604,7 @@
           <a:p>
             <a:fld id="{82653990-E29F-4583-B3DF-16019A14CFE6}" type="datetimeFigureOut">
               <a:rPr lang="sr-Latn-RS" smtClean="0"/>
-              <a:t>26.6.2016.</a:t>
+              <a:t>27.6.2016.</a:t>
             </a:fld>
             <a:endParaRPr lang="sr-Latn-RS"/>
           </a:p>
@@ -773,7 +774,7 @@
           <a:p>
             <a:fld id="{82653990-E29F-4583-B3DF-16019A14CFE6}" type="datetimeFigureOut">
               <a:rPr lang="sr-Latn-RS" smtClean="0"/>
-              <a:t>26.6.2016.</a:t>
+              <a:t>27.6.2016.</a:t>
             </a:fld>
             <a:endParaRPr lang="sr-Latn-RS"/>
           </a:p>
@@ -1019,7 +1020,7 @@
           <a:p>
             <a:fld id="{82653990-E29F-4583-B3DF-16019A14CFE6}" type="datetimeFigureOut">
               <a:rPr lang="sr-Latn-RS" smtClean="0"/>
-              <a:t>26.6.2016.</a:t>
+              <a:t>27.6.2016.</a:t>
             </a:fld>
             <a:endParaRPr lang="sr-Latn-RS"/>
           </a:p>
@@ -1251,7 +1252,7 @@
           <a:p>
             <a:fld id="{82653990-E29F-4583-B3DF-16019A14CFE6}" type="datetimeFigureOut">
               <a:rPr lang="sr-Latn-RS" smtClean="0"/>
-              <a:t>26.6.2016.</a:t>
+              <a:t>27.6.2016.</a:t>
             </a:fld>
             <a:endParaRPr lang="sr-Latn-RS"/>
           </a:p>
@@ -1618,7 +1619,7 @@
           <a:p>
             <a:fld id="{82653990-E29F-4583-B3DF-16019A14CFE6}" type="datetimeFigureOut">
               <a:rPr lang="sr-Latn-RS" smtClean="0"/>
-              <a:t>26.6.2016.</a:t>
+              <a:t>27.6.2016.</a:t>
             </a:fld>
             <a:endParaRPr lang="sr-Latn-RS"/>
           </a:p>
@@ -1736,7 +1737,7 @@
           <a:p>
             <a:fld id="{82653990-E29F-4583-B3DF-16019A14CFE6}" type="datetimeFigureOut">
               <a:rPr lang="sr-Latn-RS" smtClean="0"/>
-              <a:t>26.6.2016.</a:t>
+              <a:t>27.6.2016.</a:t>
             </a:fld>
             <a:endParaRPr lang="sr-Latn-RS"/>
           </a:p>
@@ -1831,7 +1832,7 @@
           <a:p>
             <a:fld id="{82653990-E29F-4583-B3DF-16019A14CFE6}" type="datetimeFigureOut">
               <a:rPr lang="sr-Latn-RS" smtClean="0"/>
-              <a:t>26.6.2016.</a:t>
+              <a:t>27.6.2016.</a:t>
             </a:fld>
             <a:endParaRPr lang="sr-Latn-RS"/>
           </a:p>
@@ -2108,7 +2109,7 @@
           <a:p>
             <a:fld id="{82653990-E29F-4583-B3DF-16019A14CFE6}" type="datetimeFigureOut">
               <a:rPr lang="sr-Latn-RS" smtClean="0"/>
-              <a:t>26.6.2016.</a:t>
+              <a:t>27.6.2016.</a:t>
             </a:fld>
             <a:endParaRPr lang="sr-Latn-RS"/>
           </a:p>
@@ -2361,7 +2362,7 @@
           <a:p>
             <a:fld id="{82653990-E29F-4583-B3DF-16019A14CFE6}" type="datetimeFigureOut">
               <a:rPr lang="sr-Latn-RS" smtClean="0"/>
-              <a:t>26.6.2016.</a:t>
+              <a:t>27.6.2016.</a:t>
             </a:fld>
             <a:endParaRPr lang="sr-Latn-RS"/>
           </a:p>
@@ -2574,7 +2575,7 @@
           <a:p>
             <a:fld id="{82653990-E29F-4583-B3DF-16019A14CFE6}" type="datetimeFigureOut">
               <a:rPr lang="sr-Latn-RS" smtClean="0"/>
-              <a:t>26.6.2016.</a:t>
+              <a:t>27.6.2016.</a:t>
             </a:fld>
             <a:endParaRPr lang="sr-Latn-RS"/>
           </a:p>
@@ -3394,8 +3395,8 @@
         </p:nvSpPr>
         <p:spPr>
           <a:xfrm>
-            <a:off x="734290" y="1536174"/>
-            <a:ext cx="7079673" cy="3785652"/>
+            <a:off x="1170709" y="996875"/>
+            <a:ext cx="3179617" cy="707886"/>
           </a:xfrm>
           <a:prstGeom prst="rect">
             <a:avLst/>
@@ -3409,44 +3410,19 @@
           <a:lstStyle/>
           <a:p>
             <a:r>
-              <a:rPr lang="sr-Latn-RS" sz="8000" dirty="0" smtClean="0">
+              <a:rPr lang="sr-Latn-RS" sz="4000" dirty="0" smtClean="0">
                 <a:solidFill>
                   <a:schemeClr val="bg1"/>
                 </a:solidFill>
               </a:rPr>
-              <a:t>Pitanja</a:t>
-            </a:r>
-          </a:p>
-          <a:p>
-            <a:r>
-              <a:rPr lang="sr-Latn-RS" sz="8000" dirty="0" smtClean="0">
-                <a:solidFill>
-                  <a:schemeClr val="bg1"/>
-                </a:solidFill>
-              </a:rPr>
-              <a:t>	Ideje</a:t>
-            </a:r>
-          </a:p>
-          <a:p>
-            <a:r>
-              <a:rPr lang="sr-Latn-RS" sz="8000" dirty="0" smtClean="0">
-                <a:solidFill>
-                  <a:schemeClr val="bg1"/>
-                </a:solidFill>
-              </a:rPr>
-              <a:t>		Komentari</a:t>
-            </a:r>
-            <a:endParaRPr lang="sr-Latn-RS" sz="6000" dirty="0" smtClean="0">
-              <a:solidFill>
-                <a:schemeClr val="bg1"/>
-              </a:solidFill>
-            </a:endParaRPr>
+              <a:t>Tehnologija</a:t>
+            </a:r>
           </a:p>
         </p:txBody>
       </p:sp>
       <p:pic>
         <p:nvPicPr>
-          <p:cNvPr id="9" name="Picture 8"/>
+          <p:cNvPr id="6" name="Picture 5"/>
           <p:cNvPicPr>
             <a:picLocks noChangeAspect="1"/>
           </p:cNvPicPr>
@@ -3466,8 +3442,98 @@
         </p:blipFill>
         <p:spPr>
           <a:xfrm>
-            <a:off x="5793689" y="277091"/>
-            <a:ext cx="6131611" cy="6303818"/>
+            <a:off x="6957059" y="4659558"/>
+            <a:ext cx="4678690" cy="2859030"/>
+          </a:xfrm>
+          <a:prstGeom prst="rect">
+            <a:avLst/>
+          </a:prstGeom>
+        </p:spPr>
+      </p:pic>
+      <p:pic>
+        <p:nvPicPr>
+          <p:cNvPr id="7" name="Picture 6"/>
+          <p:cNvPicPr>
+            <a:picLocks noChangeAspect="1"/>
+          </p:cNvPicPr>
+          <p:nvPr/>
+        </p:nvPicPr>
+        <p:blipFill>
+          <a:blip r:embed="rId5" cstate="print">
+            <a:extLst>
+              <a:ext uri="{28A0092B-C50C-407E-A947-70E740481C1C}">
+                <a14:useLocalDpi xmlns:a14="http://schemas.microsoft.com/office/drawing/2010/main" val="0"/>
+              </a:ext>
+            </a:extLst>
+          </a:blip>
+          <a:stretch>
+            <a:fillRect/>
+          </a:stretch>
+        </p:blipFill>
+        <p:spPr>
+          <a:xfrm>
+            <a:off x="1929243" y="2899495"/>
+            <a:ext cx="2291129" cy="2361989"/>
+          </a:xfrm>
+          <a:prstGeom prst="rect">
+            <a:avLst/>
+          </a:prstGeom>
+        </p:spPr>
+      </p:pic>
+      <p:pic>
+        <p:nvPicPr>
+          <p:cNvPr id="8" name="Picture 7"/>
+          <p:cNvPicPr>
+            <a:picLocks noChangeAspect="1"/>
+          </p:cNvPicPr>
+          <p:nvPr/>
+        </p:nvPicPr>
+        <p:blipFill>
+          <a:blip r:embed="rId6">
+            <a:extLst>
+              <a:ext uri="{28A0092B-C50C-407E-A947-70E740481C1C}">
+                <a14:useLocalDpi xmlns:a14="http://schemas.microsoft.com/office/drawing/2010/main" val="0"/>
+              </a:ext>
+            </a:extLst>
+          </a:blip>
+          <a:stretch>
+            <a:fillRect/>
+          </a:stretch>
+        </p:blipFill>
+        <p:spPr>
+          <a:xfrm>
+            <a:off x="9276666" y="2325348"/>
+            <a:ext cx="2207303" cy="2207303"/>
+          </a:xfrm>
+          <a:prstGeom prst="rect">
+            <a:avLst/>
+          </a:prstGeom>
+        </p:spPr>
+      </p:pic>
+      <p:pic>
+        <p:nvPicPr>
+          <p:cNvPr id="10" name="Picture 9"/>
+          <p:cNvPicPr>
+            <a:picLocks noChangeAspect="1"/>
+          </p:cNvPicPr>
+          <p:nvPr/>
+        </p:nvPicPr>
+        <p:blipFill>
+          <a:blip r:embed="rId7">
+            <a:extLst>
+              <a:ext uri="{28A0092B-C50C-407E-A947-70E740481C1C}">
+                <a14:useLocalDpi xmlns:a14="http://schemas.microsoft.com/office/drawing/2010/main" val="0"/>
+              </a:ext>
+            </a:extLst>
+          </a:blip>
+          <a:stretch>
+            <a:fillRect/>
+          </a:stretch>
+        </p:blipFill>
+        <p:spPr>
+          <a:xfrm>
+            <a:off x="5812747" y="748678"/>
+            <a:ext cx="3105150" cy="1609725"/>
           </a:xfrm>
           <a:prstGeom prst="rect">
             <a:avLst/>
@@ -3477,7 +3543,7 @@
     </p:spTree>
     <p:extLst>
       <p:ext uri="{BB962C8B-B14F-4D97-AF65-F5344CB8AC3E}">
-        <p14:creationId xmlns:p14="http://schemas.microsoft.com/office/powerpoint/2010/main" val="1113330469"/>
+        <p14:creationId xmlns:p14="http://schemas.microsoft.com/office/powerpoint/2010/main" val="844965899"/>
       </p:ext>
     </p:extLst>
   </p:cSld>
@@ -3596,6 +3662,195 @@
           </a:p>
         </p:txBody>
       </p:sp>
+      <p:pic>
+        <p:nvPicPr>
+          <p:cNvPr id="2" name="Picture 1"/>
+          <p:cNvPicPr>
+            <a:picLocks noChangeAspect="1"/>
+          </p:cNvPicPr>
+          <p:nvPr/>
+        </p:nvPicPr>
+        <p:blipFill>
+          <a:blip r:embed="rId4">
+            <a:extLst>
+              <a:ext uri="{28A0092B-C50C-407E-A947-70E740481C1C}">
+                <a14:useLocalDpi xmlns:a14="http://schemas.microsoft.com/office/drawing/2010/main" val="0"/>
+              </a:ext>
+            </a:extLst>
+          </a:blip>
+          <a:stretch>
+            <a:fillRect/>
+          </a:stretch>
+        </p:blipFill>
+        <p:spPr>
+          <a:xfrm>
+            <a:off x="497788" y="554181"/>
+            <a:ext cx="11160811" cy="5776783"/>
+          </a:xfrm>
+          <a:prstGeom prst="rect">
+            <a:avLst/>
+          </a:prstGeom>
+        </p:spPr>
+      </p:pic>
+      <p:pic>
+        <p:nvPicPr>
+          <p:cNvPr id="9" name="Picture 8"/>
+          <p:cNvPicPr>
+            <a:picLocks noChangeAspect="1"/>
+          </p:cNvPicPr>
+          <p:nvPr/>
+        </p:nvPicPr>
+        <p:blipFill>
+          <a:blip r:embed="rId5" cstate="print">
+            <a:duotone>
+              <a:prstClr val="black"/>
+              <a:srgbClr val="702471">
+                <a:tint val="45000"/>
+                <a:satMod val="400000"/>
+              </a:srgbClr>
+            </a:duotone>
+            <a:extLst>
+              <a:ext uri="{28A0092B-C50C-407E-A947-70E740481C1C}">
+                <a14:useLocalDpi xmlns:a14="http://schemas.microsoft.com/office/drawing/2010/main" val="0"/>
+              </a:ext>
+            </a:extLst>
+          </a:blip>
+          <a:stretch>
+            <a:fillRect/>
+          </a:stretch>
+        </p:blipFill>
+        <p:spPr>
+          <a:xfrm>
+            <a:off x="6458707" y="527036"/>
+            <a:ext cx="6131611" cy="6303818"/>
+          </a:xfrm>
+          <a:prstGeom prst="rect">
+            <a:avLst/>
+          </a:prstGeom>
+        </p:spPr>
+      </p:pic>
+    </p:spTree>
+    <p:extLst>
+      <p:ext uri="{BB962C8B-B14F-4D97-AF65-F5344CB8AC3E}">
+        <p14:creationId xmlns:p14="http://schemas.microsoft.com/office/powerpoint/2010/main" val="1113330469"/>
+      </p:ext>
+    </p:extLst>
+  </p:cSld>
+  <p:clrMapOvr>
+    <a:masterClrMapping/>
+  </p:clrMapOvr>
+  <p:timing>
+    <p:tnLst>
+      <p:par>
+        <p:cTn id="1" dur="indefinite" restart="never" nodeType="tmRoot"/>
+      </p:par>
+    </p:tnLst>
+  </p:timing>
+</p:sld>
+</file>
+
+<file path=ppt/slides/slide12.xml><?xml version="1.0" encoding="utf-8"?>
+<p:sld xmlns:a="http://schemas.openxmlformats.org/drawingml/2006/main" xmlns:r="http://schemas.openxmlformats.org/officeDocument/2006/relationships" xmlns:p="http://schemas.openxmlformats.org/presentationml/2006/main">
+  <p:cSld>
+    <p:spTree>
+      <p:nvGrpSpPr>
+        <p:cNvPr id="1" name=""/>
+        <p:cNvGrpSpPr/>
+        <p:nvPr/>
+      </p:nvGrpSpPr>
+      <p:grpSpPr>
+        <a:xfrm>
+          <a:off x="0" y="0"/>
+          <a:ext cx="0" cy="0"/>
+          <a:chOff x="0" y="0"/>
+          <a:chExt cx="0" cy="0"/>
+        </a:xfrm>
+      </p:grpSpPr>
+      <p:pic>
+        <p:nvPicPr>
+          <p:cNvPr id="5" name="Picture 4"/>
+          <p:cNvPicPr>
+            <a:picLocks noChangeAspect="1"/>
+          </p:cNvPicPr>
+          <p:nvPr/>
+        </p:nvPicPr>
+        <p:blipFill>
+          <a:blip r:embed="rId2">
+            <a:extLst>
+              <a:ext uri="{BEBA8EAE-BF5A-486C-A8C5-ECC9F3942E4B}">
+                <a14:imgProps xmlns:a14="http://schemas.microsoft.com/office/drawing/2010/main">
+                  <a14:imgLayer r:embed="rId3">
+                    <a14:imgEffect>
+                      <a14:saturation sat="66000"/>
+                    </a14:imgEffect>
+                  </a14:imgLayer>
+                </a14:imgProps>
+              </a:ext>
+              <a:ext uri="{28A0092B-C50C-407E-A947-70E740481C1C}">
+                <a14:useLocalDpi xmlns:a14="http://schemas.microsoft.com/office/drawing/2010/main" val="0"/>
+              </a:ext>
+            </a:extLst>
+          </a:blip>
+          <a:stretch>
+            <a:fillRect/>
+          </a:stretch>
+        </p:blipFill>
+        <p:spPr>
+          <a:xfrm>
+            <a:off x="0" y="0"/>
+            <a:ext cx="12192000" cy="6858000"/>
+          </a:xfrm>
+          <a:prstGeom prst="rect">
+            <a:avLst/>
+          </a:prstGeom>
+        </p:spPr>
+      </p:pic>
+      <p:sp>
+        <p:nvSpPr>
+          <p:cNvPr id="3" name="Rectangle 2"/>
+          <p:cNvSpPr/>
+          <p:nvPr/>
+        </p:nvSpPr>
+        <p:spPr>
+          <a:xfrm>
+            <a:off x="533400" y="554182"/>
+            <a:ext cx="11125200" cy="5749636"/>
+          </a:xfrm>
+          <a:prstGeom prst="rect">
+            <a:avLst/>
+          </a:prstGeom>
+          <a:solidFill>
+            <a:schemeClr val="dk1">
+              <a:alpha val="50000"/>
+            </a:schemeClr>
+          </a:solidFill>
+          <a:ln>
+            <a:noFill/>
+          </a:ln>
+        </p:spPr>
+        <p:style>
+          <a:lnRef idx="0">
+            <a:scrgbClr r="0" g="0" b="0"/>
+          </a:lnRef>
+          <a:fillRef idx="0">
+            <a:scrgbClr r="0" g="0" b="0"/>
+          </a:fillRef>
+          <a:effectRef idx="0">
+            <a:scrgbClr r="0" g="0" b="0"/>
+          </a:effectRef>
+          <a:fontRef idx="minor">
+            <a:schemeClr val="lt1"/>
+          </a:fontRef>
+        </p:style>
+        <p:txBody>
+          <a:bodyPr rtlCol="0" anchor="ctr"/>
+          <a:lstStyle/>
+          <a:p>
+            <a:pPr algn="ctr"/>
+            <a:endParaRPr lang="sr-Latn-RS"/>
+          </a:p>
+        </p:txBody>
+      </p:sp>
       <p:sp>
         <p:nvSpPr>
           <p:cNvPr id="4" name="TextBox 3"/>
@@ -3632,15 +3887,7 @@
                   <a:schemeClr val="bg1"/>
                 </a:solidFill>
               </a:rPr>
-              <a:t>Hvala na pažnji</a:t>
-            </a:r>
-            <a:r>
-              <a:rPr lang="sr-Latn-RS" sz="11500" dirty="0" smtClean="0">
-                <a:solidFill>
-                  <a:schemeClr val="bg1"/>
-                </a:solidFill>
-              </a:rPr>
-              <a:t>.</a:t>
+              <a:t>Hvala na pažnji.</a:t>
             </a:r>
             <a:r>
               <a:rPr lang="sr-Latn-RS" dirty="0" smtClean="0">
@@ -3827,7 +4074,6 @@
           </a:bodyPr>
           <a:lstStyle/>
           <a:p>
-            <a:pPr algn="just"/>
             <a:r>
               <a:rPr lang="sr-Latn-RS" sz="4000" dirty="0" smtClean="0">
                 <a:solidFill>
@@ -3838,7 +4084,6 @@
             </a:r>
           </a:p>
           <a:p>
-            <a:pPr algn="just"/>
             <a:endParaRPr lang="sr-Latn-RS" sz="4000" dirty="0" smtClean="0">
               <a:solidFill>
                 <a:schemeClr val="bg1"/>
@@ -3846,7 +4091,7 @@
             </a:endParaRPr>
           </a:p>
           <a:p>
-            <a:pPr marL="1028700" lvl="1" indent="-571500" algn="just">
+            <a:pPr marL="1028700" lvl="1" indent="-571500">
               <a:buFont typeface="Arial" panose="020B0604020202020204" pitchFamily="34" charset="0"/>
               <a:buChar char="•"/>
             </a:pPr>
@@ -3860,7 +4105,7 @@
             </a:r>
           </a:p>
           <a:p>
-            <a:pPr marL="1028700" lvl="1" indent="-571500" algn="just">
+            <a:pPr marL="1028700" lvl="1" indent="-571500">
               <a:buFont typeface="Arial" panose="020B0604020202020204" pitchFamily="34" charset="0"/>
               <a:buChar char="•"/>
             </a:pPr>
@@ -3874,7 +4119,7 @@
             </a:r>
           </a:p>
           <a:p>
-            <a:pPr marL="1028700" lvl="1" indent="-571500" algn="just">
+            <a:pPr marL="1028700" lvl="1" indent="-571500">
               <a:buFont typeface="Arial" panose="020B0604020202020204" pitchFamily="34" charset="0"/>
               <a:buChar char="•"/>
             </a:pPr>
@@ -3889,6 +4134,36 @@
           </a:p>
         </p:txBody>
       </p:sp>
+      <p:pic>
+        <p:nvPicPr>
+          <p:cNvPr id="3" name="Picture 2"/>
+          <p:cNvPicPr>
+            <a:picLocks noChangeAspect="1"/>
+          </p:cNvPicPr>
+          <p:nvPr/>
+        </p:nvPicPr>
+        <p:blipFill>
+          <a:blip r:embed="rId4">
+            <a:extLst>
+              <a:ext uri="{28A0092B-C50C-407E-A947-70E740481C1C}">
+                <a14:useLocalDpi xmlns:a14="http://schemas.microsoft.com/office/drawing/2010/main" val="0"/>
+              </a:ext>
+            </a:extLst>
+          </a:blip>
+          <a:stretch>
+            <a:fillRect/>
+          </a:stretch>
+        </p:blipFill>
+        <p:spPr>
+          <a:xfrm rot="20328452">
+            <a:off x="8243192" y="-115796"/>
+            <a:ext cx="2376041" cy="7018764"/>
+          </a:xfrm>
+          <a:prstGeom prst="rect">
+            <a:avLst/>
+          </a:prstGeom>
+        </p:spPr>
+      </p:pic>
     </p:spTree>
     <p:extLst>
       <p:ext uri="{BB962C8B-B14F-4D97-AF65-F5344CB8AC3E}">
@@ -4033,7 +4308,6 @@
           </a:bodyPr>
           <a:lstStyle/>
           <a:p>
-            <a:pPr algn="just"/>
             <a:r>
               <a:rPr lang="sr-Latn-RS" sz="4000" dirty="0" smtClean="0">
                 <a:solidFill>
@@ -4044,7 +4318,6 @@
             </a:r>
           </a:p>
           <a:p>
-            <a:pPr algn="just"/>
             <a:endParaRPr lang="sr-Latn-RS" sz="4000" dirty="0" smtClean="0">
               <a:solidFill>
                 <a:schemeClr val="bg1"/>
@@ -4052,7 +4325,7 @@
             </a:endParaRPr>
           </a:p>
           <a:p>
-            <a:pPr marL="1028700" lvl="1" indent="-571500" algn="just">
+            <a:pPr marL="1028700" lvl="1" indent="-571500">
               <a:buFont typeface="Arial" panose="020B0604020202020204" pitchFamily="34" charset="0"/>
               <a:buChar char="•"/>
             </a:pPr>
@@ -4066,7 +4339,7 @@
             </a:r>
           </a:p>
           <a:p>
-            <a:pPr marL="1485900" lvl="2" indent="-571500" algn="just">
+            <a:pPr marL="1485900" lvl="2" indent="-571500">
               <a:buFont typeface="+mj-lt"/>
               <a:buAutoNum type="romanUcPeriod"/>
             </a:pPr>
@@ -4076,11 +4349,40 @@
                   <a:schemeClr val="bg1"/>
                 </a:solidFill>
               </a:rPr>
-              <a:t>Radi lakše komunikacije (messenger) i pribavljanja kontakta članova</a:t>
-            </a:r>
-          </a:p>
-          <a:p>
-            <a:pPr marL="1485900" lvl="2" indent="-571500" algn="just">
+              <a:t>Radi lakše komunikacije </a:t>
+            </a:r>
+            <a:r>
+              <a:rPr lang="sr-Latn-RS" sz="2800" dirty="0" smtClean="0">
+                <a:solidFill>
+                  <a:schemeClr val="bg1"/>
+                </a:solidFill>
+              </a:rPr>
+              <a:t>i </a:t>
+            </a:r>
+            <a:r>
+              <a:rPr lang="sr-Latn-RS" sz="2800" dirty="0" smtClean="0">
+                <a:solidFill>
+                  <a:schemeClr val="bg1"/>
+                </a:solidFill>
+              </a:rPr>
+              <a:t>pribavljanja kontakta </a:t>
+            </a:r>
+            <a:r>
+              <a:rPr lang="sr-Latn-RS" sz="2800" dirty="0" smtClean="0">
+                <a:solidFill>
+                  <a:schemeClr val="bg1"/>
+                </a:solidFill>
+              </a:rPr>
+              <a:t>članova</a:t>
+            </a:r>
+            <a:endParaRPr lang="sr-Latn-RS" sz="2800" dirty="0" smtClean="0">
+              <a:solidFill>
+                <a:schemeClr val="bg1"/>
+              </a:solidFill>
+            </a:endParaRPr>
+          </a:p>
+          <a:p>
+            <a:pPr marL="1485900" lvl="2" indent="-571500">
               <a:buFont typeface="+mj-lt"/>
               <a:buAutoNum type="romanUcPeriod"/>
             </a:pPr>
@@ -4094,7 +4396,7 @@
             </a:r>
           </a:p>
           <a:p>
-            <a:pPr marL="1485900" lvl="2" indent="-571500" algn="just">
+            <a:pPr marL="1485900" lvl="2" indent="-571500">
               <a:buFont typeface="+mj-lt"/>
               <a:buAutoNum type="romanUcPeriod"/>
             </a:pPr>
@@ -4109,6 +4411,36 @@
           </a:p>
         </p:txBody>
       </p:sp>
+      <p:pic>
+        <p:nvPicPr>
+          <p:cNvPr id="3" name="Picture 2"/>
+          <p:cNvPicPr>
+            <a:picLocks noChangeAspect="1"/>
+          </p:cNvPicPr>
+          <p:nvPr/>
+        </p:nvPicPr>
+        <p:blipFill>
+          <a:blip r:embed="rId4">
+            <a:extLst>
+              <a:ext uri="{28A0092B-C50C-407E-A947-70E740481C1C}">
+                <a14:useLocalDpi xmlns:a14="http://schemas.microsoft.com/office/drawing/2010/main" val="0"/>
+              </a:ext>
+            </a:extLst>
+          </a:blip>
+          <a:stretch>
+            <a:fillRect/>
+          </a:stretch>
+        </p:blipFill>
+        <p:spPr>
+          <a:xfrm rot="1194162">
+            <a:off x="-51665" y="1144462"/>
+            <a:ext cx="4647619" cy="6723809"/>
+          </a:xfrm>
+          <a:prstGeom prst="rect">
+            <a:avLst/>
+          </a:prstGeom>
+        </p:spPr>
+      </p:pic>
     </p:spTree>
     <p:extLst>
       <p:ext uri="{BB962C8B-B14F-4D97-AF65-F5344CB8AC3E}">
@@ -4239,8 +4571,8 @@
         </p:nvSpPr>
         <p:spPr>
           <a:xfrm>
-            <a:off x="678872" y="1043732"/>
-            <a:ext cx="5902037" cy="4770537"/>
+            <a:off x="1524000" y="1690063"/>
+            <a:ext cx="9310255" cy="3477875"/>
           </a:xfrm>
           <a:prstGeom prst="rect">
             <a:avLst/>
@@ -4253,7 +4585,6 @@
           </a:bodyPr>
           <a:lstStyle/>
           <a:p>
-            <a:pPr algn="just"/>
             <a:r>
               <a:rPr lang="sr-Latn-RS" sz="4000" dirty="0" smtClean="0">
                 <a:solidFill>
@@ -4264,7 +4595,6 @@
             </a:r>
           </a:p>
           <a:p>
-            <a:pPr algn="just"/>
             <a:endParaRPr lang="sr-Latn-RS" sz="4000" dirty="0" smtClean="0">
               <a:solidFill>
                 <a:schemeClr val="bg1"/>
@@ -4272,7 +4602,7 @@
             </a:endParaRPr>
           </a:p>
           <a:p>
-            <a:pPr marL="1028700" lvl="1" indent="-571500" algn="just">
+            <a:pPr marL="1028700" lvl="1" indent="-571500">
               <a:buFont typeface="Arial" panose="020B0604020202020204" pitchFamily="34" charset="0"/>
               <a:buChar char="•"/>
             </a:pPr>
@@ -4286,7 +4616,7 @@
             </a:r>
           </a:p>
           <a:p>
-            <a:pPr marL="1485900" lvl="2" indent="-571500" algn="just">
+            <a:pPr marL="1485900" lvl="2" indent="-571500">
               <a:buFont typeface="+mj-lt"/>
               <a:buAutoNum type="romanUcPeriod"/>
             </a:pPr>
@@ -4431,8 +4761,8 @@
         </p:nvSpPr>
         <p:spPr>
           <a:xfrm>
-            <a:off x="5250873" y="828288"/>
-            <a:ext cx="6407728" cy="5201424"/>
+            <a:off x="533400" y="1474619"/>
+            <a:ext cx="5465618" cy="3908762"/>
           </a:xfrm>
           <a:prstGeom prst="rect">
             <a:avLst/>
@@ -4445,18 +4775,16 @@
           </a:bodyPr>
           <a:lstStyle/>
           <a:p>
-            <a:pPr algn="just"/>
             <a:r>
               <a:rPr lang="sr-Latn-RS" sz="4000" dirty="0" smtClean="0">
                 <a:solidFill>
                   <a:schemeClr val="bg1"/>
                 </a:solidFill>
               </a:rPr>
-              <a:t>Sastanci</a:t>
-            </a:r>
-          </a:p>
-          <a:p>
-            <a:pPr algn="just"/>
+              <a:t>Glasanja</a:t>
+            </a:r>
+          </a:p>
+          <a:p>
             <a:endParaRPr lang="sr-Latn-RS" sz="4000" dirty="0" smtClean="0">
               <a:solidFill>
                 <a:schemeClr val="bg1"/>
@@ -4464,7 +4792,7 @@
             </a:endParaRPr>
           </a:p>
           <a:p>
-            <a:pPr marL="1028700" lvl="1" indent="-571500" algn="just">
+            <a:pPr marL="1028700" lvl="1" indent="-571500">
               <a:buFont typeface="Arial" panose="020B0604020202020204" pitchFamily="34" charset="0"/>
               <a:buChar char="•"/>
             </a:pPr>
@@ -4474,11 +4802,11 @@
                   <a:schemeClr val="bg1"/>
                 </a:solidFill>
               </a:rPr>
-              <a:t>Sadrži mogućnost zakazivanja sastanaka</a:t>
-            </a:r>
-          </a:p>
-          <a:p>
-            <a:pPr marL="1485900" lvl="2" indent="-571500" algn="just">
+              <a:t>Mogućnost članova da se izjasne o određenoj temi</a:t>
+            </a:r>
+          </a:p>
+          <a:p>
+            <a:pPr marL="1485900" lvl="2" indent="-571500">
               <a:buFont typeface="+mj-lt"/>
               <a:buAutoNum type="romanUcPeriod"/>
             </a:pPr>
@@ -4488,43 +4816,45 @@
                   <a:schemeClr val="bg1"/>
                 </a:solidFill>
               </a:rPr>
-              <a:t>Jednostavnije zakazivanje sastanka i slanje na mail liste</a:t>
-            </a:r>
-          </a:p>
-          <a:p>
-            <a:pPr marL="1485900" lvl="2" indent="-571500" algn="just">
-              <a:buFont typeface="+mj-lt"/>
-              <a:buAutoNum type="romanUcPeriod"/>
-            </a:pPr>
-            <a:r>
-              <a:rPr lang="sr-Latn-RS" sz="2800" dirty="0" smtClean="0">
-                <a:solidFill>
-                  <a:schemeClr val="bg1"/>
-                </a:solidFill>
-              </a:rPr>
-              <a:t>Brzi pregled ko nije u mogućnosti da dođe</a:t>
-            </a:r>
-          </a:p>
-          <a:p>
-            <a:pPr marL="1485900" lvl="2" indent="-571500" algn="just">
-              <a:buFont typeface="+mj-lt"/>
-              <a:buAutoNum type="romanUcPeriod"/>
-            </a:pPr>
-            <a:r>
-              <a:rPr lang="sr-Latn-RS" sz="2800" dirty="0" smtClean="0">
-                <a:solidFill>
-                  <a:schemeClr val="bg1"/>
-                </a:solidFill>
-              </a:rPr>
-              <a:t>Unošenje podataka ko je sve prisustvovao i praćenje aktivnosti članova</a:t>
-            </a:r>
-          </a:p>
-        </p:txBody>
-      </p:sp>
+              <a:t>Radi brzog izglašavanja najbolje i najodgovarajuće opcije za donošenje većinskih odluka</a:t>
+            </a:r>
+          </a:p>
+        </p:txBody>
+      </p:sp>
+      <p:pic>
+        <p:nvPicPr>
+          <p:cNvPr id="2" name="Picture 1"/>
+          <p:cNvPicPr>
+            <a:picLocks noChangeAspect="1"/>
+          </p:cNvPicPr>
+          <p:nvPr/>
+        </p:nvPicPr>
+        <p:blipFill>
+          <a:blip r:embed="rId4">
+            <a:extLst>
+              <a:ext uri="{28A0092B-C50C-407E-A947-70E740481C1C}">
+                <a14:useLocalDpi xmlns:a14="http://schemas.microsoft.com/office/drawing/2010/main" val="0"/>
+              </a:ext>
+            </a:extLst>
+          </a:blip>
+          <a:stretch>
+            <a:fillRect/>
+          </a:stretch>
+        </p:blipFill>
+        <p:spPr>
+          <a:xfrm rot="1576436">
+            <a:off x="7069003" y="2115851"/>
+            <a:ext cx="9712594" cy="5633998"/>
+          </a:xfrm>
+          <a:prstGeom prst="rect">
+            <a:avLst/>
+          </a:prstGeom>
+        </p:spPr>
+      </p:pic>
     </p:spTree>
     <p:extLst>
       <p:ext uri="{BB962C8B-B14F-4D97-AF65-F5344CB8AC3E}">
-        <p14:creationId xmlns:p14="http://schemas.microsoft.com/office/powerpoint/2010/main" val="2115269944"/>
+        <p14:creationId xmlns:p14="http://schemas.microsoft.com/office/powerpoint/2010/main" val="1672952420"/>
       </p:ext>
     </p:extLst>
   </p:cSld>
@@ -4651,8 +4981,8 @@
         </p:nvSpPr>
         <p:spPr>
           <a:xfrm>
-            <a:off x="533400" y="1474619"/>
-            <a:ext cx="5465618" cy="3908762"/>
+            <a:off x="1378527" y="1474619"/>
+            <a:ext cx="9434946" cy="3908762"/>
           </a:xfrm>
           <a:prstGeom prst="rect">
             <a:avLst/>
@@ -4665,18 +4995,16 @@
           </a:bodyPr>
           <a:lstStyle/>
           <a:p>
-            <a:pPr algn="just"/>
             <a:r>
               <a:rPr lang="sr-Latn-RS" sz="4000" dirty="0" smtClean="0">
                 <a:solidFill>
                   <a:schemeClr val="bg1"/>
                 </a:solidFill>
               </a:rPr>
-              <a:t>Glasanja</a:t>
-            </a:r>
-          </a:p>
-          <a:p>
-            <a:pPr algn="just"/>
+              <a:t>Sastanci</a:t>
+            </a:r>
+          </a:p>
+          <a:p>
             <a:endParaRPr lang="sr-Latn-RS" sz="4000" dirty="0" smtClean="0">
               <a:solidFill>
                 <a:schemeClr val="bg1"/>
@@ -4684,7 +5012,7 @@
             </a:endParaRPr>
           </a:p>
           <a:p>
-            <a:pPr marL="1028700" lvl="1" indent="-571500" algn="just">
+            <a:pPr marL="1028700" lvl="1" indent="-571500">
               <a:buFont typeface="Arial" panose="020B0604020202020204" pitchFamily="34" charset="0"/>
               <a:buChar char="•"/>
             </a:pPr>
@@ -4694,11 +5022,11 @@
                   <a:schemeClr val="bg1"/>
                 </a:solidFill>
               </a:rPr>
-              <a:t>Mogućnost članova da se izjasne o određenoj temi</a:t>
-            </a:r>
-          </a:p>
-          <a:p>
-            <a:pPr marL="1485900" lvl="2" indent="-571500" algn="just">
+              <a:t>Sadrži mogućnost zakazivanja sastanaka</a:t>
+            </a:r>
+          </a:p>
+          <a:p>
+            <a:pPr marL="1485900" lvl="2" indent="-571500">
               <a:buFont typeface="+mj-lt"/>
               <a:buAutoNum type="romanUcPeriod"/>
             </a:pPr>
@@ -4708,7 +5036,35 @@
                   <a:schemeClr val="bg1"/>
                 </a:solidFill>
               </a:rPr>
-              <a:t>Radi brzog izglašavanja najbolje i najodgovarajuće opcije za donošenje većinskih odluka</a:t>
+              <a:t>Jednostavnije zakazivanje sastanka i slanje na mail liste</a:t>
+            </a:r>
+          </a:p>
+          <a:p>
+            <a:pPr marL="1485900" lvl="2" indent="-571500">
+              <a:buFont typeface="+mj-lt"/>
+              <a:buAutoNum type="romanUcPeriod"/>
+            </a:pPr>
+            <a:r>
+              <a:rPr lang="sr-Latn-RS" sz="2800" dirty="0" smtClean="0">
+                <a:solidFill>
+                  <a:schemeClr val="bg1"/>
+                </a:solidFill>
+              </a:rPr>
+              <a:t>Brzi pregled ko nije u mogućnosti da dođe</a:t>
+            </a:r>
+          </a:p>
+          <a:p>
+            <a:pPr marL="1485900" lvl="2" indent="-571500">
+              <a:buFont typeface="+mj-lt"/>
+              <a:buAutoNum type="romanUcPeriod"/>
+            </a:pPr>
+            <a:r>
+              <a:rPr lang="sr-Latn-RS" sz="2800" dirty="0" smtClean="0">
+                <a:solidFill>
+                  <a:schemeClr val="bg1"/>
+                </a:solidFill>
+              </a:rPr>
+              <a:t>Unošenje podataka ko je sve prisustvovao i praćenje aktivnosti članova</a:t>
             </a:r>
           </a:p>
         </p:txBody>
@@ -4716,7 +5072,7 @@
     </p:spTree>
     <p:extLst>
       <p:ext uri="{BB962C8B-B14F-4D97-AF65-F5344CB8AC3E}">
-        <p14:creationId xmlns:p14="http://schemas.microsoft.com/office/powerpoint/2010/main" val="1672952420"/>
+        <p14:creationId xmlns:p14="http://schemas.microsoft.com/office/powerpoint/2010/main" val="2115269944"/>
       </p:ext>
     </p:extLst>
   </p:cSld>
@@ -4791,7 +5147,7 @@
       </p:pic>
       <p:sp>
         <p:nvSpPr>
-          <p:cNvPr id="3" name="Rectangle 2"/>
+          <p:cNvPr id="4" name="Rectangle 3"/>
           <p:cNvSpPr/>
           <p:nvPr/>
         </p:nvSpPr>
@@ -4837,14 +5193,14 @@
       </p:sp>
       <p:sp>
         <p:nvSpPr>
-          <p:cNvPr id="4" name="TextBox 3"/>
+          <p:cNvPr id="6" name="TextBox 5"/>
           <p:cNvSpPr txBox="1"/>
           <p:nvPr/>
         </p:nvSpPr>
         <p:spPr>
           <a:xfrm>
-            <a:off x="6082144" y="1690063"/>
-            <a:ext cx="5576455" cy="3477875"/>
+            <a:off x="5756563" y="1690063"/>
+            <a:ext cx="5902037" cy="3908762"/>
           </a:xfrm>
           <a:prstGeom prst="rect">
             <a:avLst/>
@@ -4857,18 +5213,16 @@
           </a:bodyPr>
           <a:lstStyle/>
           <a:p>
-            <a:pPr algn="just"/>
             <a:r>
               <a:rPr lang="sr-Latn-RS" sz="4000" dirty="0" smtClean="0">
                 <a:solidFill>
                   <a:schemeClr val="bg1"/>
                 </a:solidFill>
               </a:rPr>
-              <a:t>M/P izveštaji</a:t>
-            </a:r>
-          </a:p>
-          <a:p>
-            <a:pPr algn="just"/>
+              <a:t>Messenger</a:t>
+            </a:r>
+          </a:p>
+          <a:p>
             <a:endParaRPr lang="sr-Latn-RS" sz="4000" dirty="0" smtClean="0">
               <a:solidFill>
                 <a:schemeClr val="bg1"/>
@@ -4876,7 +5230,7 @@
             </a:endParaRPr>
           </a:p>
           <a:p>
-            <a:pPr marL="1028700" lvl="1" indent="-571500" algn="just">
+            <a:pPr marL="1028700" lvl="1" indent="-571500">
               <a:buFont typeface="Arial" panose="020B0604020202020204" pitchFamily="34" charset="0"/>
               <a:buChar char="•"/>
             </a:pPr>
@@ -4886,15 +5240,59 @@
                   <a:schemeClr val="bg1"/>
                 </a:solidFill>
               </a:rPr>
-              <a:t>Mogućnost članova da se iznesu svoje mišljenje o svom masteru/padavanu i skrenu pažnju na potencijalne probleme za celu organizaciju</a:t>
-            </a:r>
-          </a:p>
-        </p:txBody>
-      </p:sp>
+              <a:t>Mogućnost interaktivnog dopisivanja sa ostalim članovima</a:t>
+            </a:r>
+          </a:p>
+          <a:p>
+            <a:pPr marL="1028700" lvl="1" indent="-571500">
+              <a:buFont typeface="Arial" panose="020B0604020202020204" pitchFamily="34" charset="0"/>
+              <a:buChar char="•"/>
+            </a:pPr>
+            <a:r>
+              <a:rPr lang="sr-Latn-RS" sz="2800" dirty="0" smtClean="0">
+                <a:solidFill>
+                  <a:schemeClr val="bg1"/>
+                </a:solidFill>
+              </a:rPr>
+              <a:t>Prilagođenost mobilnim platformama ovde dolazi do izražaja</a:t>
+            </a:r>
+          </a:p>
+        </p:txBody>
+      </p:sp>
+      <p:pic>
+        <p:nvPicPr>
+          <p:cNvPr id="3" name="Picture 2"/>
+          <p:cNvPicPr>
+            <a:picLocks noChangeAspect="1"/>
+          </p:cNvPicPr>
+          <p:nvPr/>
+        </p:nvPicPr>
+        <p:blipFill>
+          <a:blip r:embed="rId4">
+            <a:extLst>
+              <a:ext uri="{28A0092B-C50C-407E-A947-70E740481C1C}">
+                <a14:useLocalDpi xmlns:a14="http://schemas.microsoft.com/office/drawing/2010/main" val="0"/>
+              </a:ext>
+            </a:extLst>
+          </a:blip>
+          <a:stretch>
+            <a:fillRect/>
+          </a:stretch>
+        </p:blipFill>
+        <p:spPr>
+          <a:xfrm>
+            <a:off x="755073" y="307109"/>
+            <a:ext cx="3512127" cy="6243781"/>
+          </a:xfrm>
+          <a:prstGeom prst="rect">
+            <a:avLst/>
+          </a:prstGeom>
+        </p:spPr>
+      </p:pic>
     </p:spTree>
     <p:extLst>
       <p:ext uri="{BB962C8B-B14F-4D97-AF65-F5344CB8AC3E}">
-        <p14:creationId xmlns:p14="http://schemas.microsoft.com/office/powerpoint/2010/main" val="1744477792"/>
+        <p14:creationId xmlns:p14="http://schemas.microsoft.com/office/powerpoint/2010/main" val="2752351000"/>
       </p:ext>
     </p:extLst>
   </p:cSld>
@@ -5021,8 +5419,8 @@
         </p:nvSpPr>
         <p:spPr>
           <a:xfrm>
-            <a:off x="533399" y="828288"/>
-            <a:ext cx="6781801" cy="5201424"/>
+            <a:off x="834736" y="1690063"/>
+            <a:ext cx="10522528" cy="3477875"/>
           </a:xfrm>
           <a:prstGeom prst="rect">
             <a:avLst/>
@@ -5035,7 +5433,6 @@
           </a:bodyPr>
           <a:lstStyle/>
           <a:p>
-            <a:pPr algn="just"/>
             <a:r>
               <a:rPr lang="sr-Latn-RS" sz="4000" dirty="0" smtClean="0">
                 <a:solidFill>
@@ -5046,7 +5443,6 @@
             </a:r>
           </a:p>
           <a:p>
-            <a:pPr algn="just"/>
             <a:endParaRPr lang="sr-Latn-RS" sz="4000" dirty="0" smtClean="0">
               <a:solidFill>
                 <a:schemeClr val="bg1"/>
@@ -5054,7 +5450,7 @@
             </a:endParaRPr>
           </a:p>
           <a:p>
-            <a:pPr marL="1028700" lvl="1" indent="-571500" algn="just">
+            <a:pPr marL="1028700" lvl="1" indent="-571500">
               <a:buFont typeface="Arial" panose="020B0604020202020204" pitchFamily="34" charset="0"/>
               <a:buChar char="•"/>
             </a:pPr>
@@ -5068,7 +5464,7 @@
             </a:r>
           </a:p>
           <a:p>
-            <a:pPr marL="1485900" lvl="2" indent="-571500" algn="just">
+            <a:pPr marL="1485900" lvl="2" indent="-571500">
               <a:buFont typeface="+mj-lt"/>
               <a:buAutoNum type="romanUcPeriod"/>
             </a:pPr>
@@ -5082,7 +5478,7 @@
             </a:r>
           </a:p>
           <a:p>
-            <a:pPr marL="1485900" lvl="2" indent="-571500" algn="just">
+            <a:pPr marL="1485900" lvl="2" indent="-571500">
               <a:buFont typeface="+mj-lt"/>
               <a:buAutoNum type="romanUcPeriod"/>
             </a:pPr>
@@ -5227,8 +5623,8 @@
         </p:nvSpPr>
         <p:spPr>
           <a:xfrm>
-            <a:off x="1170709" y="996875"/>
-            <a:ext cx="3179617" cy="707886"/>
+            <a:off x="533400" y="2395056"/>
+            <a:ext cx="5576455" cy="3908762"/>
           </a:xfrm>
           <a:prstGeom prst="rect">
             <a:avLst/>
@@ -5247,21 +5643,58 @@
                   <a:schemeClr val="bg1"/>
                 </a:solidFill>
               </a:rPr>
-              <a:t>Tehnologija</a:t>
+              <a:t>M/P izveštaji</a:t>
+            </a:r>
+          </a:p>
+          <a:p>
+            <a:endParaRPr lang="sr-Latn-RS" sz="4000" dirty="0" smtClean="0">
+              <a:solidFill>
+                <a:schemeClr val="bg1"/>
+              </a:solidFill>
+            </a:endParaRPr>
+          </a:p>
+          <a:p>
+            <a:pPr marL="1028700" lvl="1" indent="-571500">
+              <a:buFont typeface="Arial" panose="020B0604020202020204" pitchFamily="34" charset="0"/>
+              <a:buChar char="•"/>
+            </a:pPr>
+            <a:r>
+              <a:rPr lang="sr-Latn-RS" sz="2800" dirty="0" smtClean="0">
+                <a:solidFill>
+                  <a:schemeClr val="bg1"/>
+                </a:solidFill>
+              </a:rPr>
+              <a:t>Mogućnost članova da se iznesu svoje mišljenje o svom masteru/padavanu </a:t>
+            </a:r>
+            <a:r>
+              <a:rPr lang="sr-Latn-RS" sz="2800" dirty="0" smtClean="0">
+                <a:solidFill>
+                  <a:schemeClr val="bg1"/>
+                </a:solidFill>
+              </a:rPr>
+              <a:t>podnošenjem izveštaja i </a:t>
+            </a:r>
+            <a:r>
+              <a:rPr lang="sr-Latn-RS" sz="2800" dirty="0" smtClean="0">
+                <a:solidFill>
+                  <a:schemeClr val="bg1"/>
+                </a:solidFill>
+              </a:rPr>
+              <a:t>skrenu pažnju na potencijalne probleme za celu organizaciju</a:t>
             </a:r>
           </a:p>
         </p:txBody>
       </p:sp>
       <p:pic>
         <p:nvPicPr>
-          <p:cNvPr id="6" name="Picture 5"/>
+          <p:cNvPr id="2" name="Picture 1"/>
           <p:cNvPicPr>
             <a:picLocks noChangeAspect="1"/>
           </p:cNvPicPr>
           <p:nvPr/>
         </p:nvPicPr>
         <p:blipFill>
-          <a:blip r:embed="rId4" cstate="print">
+          <a:blip r:embed="rId4">
             <a:extLst>
               <a:ext uri="{28A0092B-C50C-407E-A947-70E740481C1C}">
                 <a14:useLocalDpi xmlns:a14="http://schemas.microsoft.com/office/drawing/2010/main" val="0"/>
@@ -5274,8 +5707,8 @@
         </p:blipFill>
         <p:spPr>
           <a:xfrm>
-            <a:off x="6957059" y="4659558"/>
-            <a:ext cx="4678690" cy="2859030"/>
+            <a:off x="3705130" y="554182"/>
+            <a:ext cx="5876250" cy="3041519"/>
           </a:xfrm>
           <a:prstGeom prst="rect">
             <a:avLst/>
@@ -5284,14 +5717,14 @@
       </p:pic>
       <p:pic>
         <p:nvPicPr>
-          <p:cNvPr id="7" name="Picture 6"/>
+          <p:cNvPr id="6" name="Picture 5"/>
           <p:cNvPicPr>
             <a:picLocks noChangeAspect="1"/>
           </p:cNvPicPr>
           <p:nvPr/>
         </p:nvPicPr>
         <p:blipFill>
-          <a:blip r:embed="rId5" cstate="print">
+          <a:blip r:embed="rId5">
             <a:extLst>
               <a:ext uri="{28A0092B-C50C-407E-A947-70E740481C1C}">
                 <a14:useLocalDpi xmlns:a14="http://schemas.microsoft.com/office/drawing/2010/main" val="0"/>
@@ -5304,68 +5737,8 @@
         </p:blipFill>
         <p:spPr>
           <a:xfrm>
-            <a:off x="1929243" y="2899495"/>
-            <a:ext cx="2291129" cy="2361989"/>
-          </a:xfrm>
-          <a:prstGeom prst="rect">
-            <a:avLst/>
-          </a:prstGeom>
-        </p:spPr>
-      </p:pic>
-      <p:pic>
-        <p:nvPicPr>
-          <p:cNvPr id="8" name="Picture 7"/>
-          <p:cNvPicPr>
-            <a:picLocks noChangeAspect="1"/>
-          </p:cNvPicPr>
-          <p:nvPr/>
-        </p:nvPicPr>
-        <p:blipFill>
-          <a:blip r:embed="rId6">
-            <a:extLst>
-              <a:ext uri="{28A0092B-C50C-407E-A947-70E740481C1C}">
-                <a14:useLocalDpi xmlns:a14="http://schemas.microsoft.com/office/drawing/2010/main" val="0"/>
-              </a:ext>
-            </a:extLst>
-          </a:blip>
-          <a:stretch>
-            <a:fillRect/>
-          </a:stretch>
-        </p:blipFill>
-        <p:spPr>
-          <a:xfrm>
-            <a:off x="9276666" y="2325348"/>
-            <a:ext cx="2207303" cy="2207303"/>
-          </a:xfrm>
-          <a:prstGeom prst="rect">
-            <a:avLst/>
-          </a:prstGeom>
-        </p:spPr>
-      </p:pic>
-      <p:pic>
-        <p:nvPicPr>
-          <p:cNvPr id="10" name="Picture 9"/>
-          <p:cNvPicPr>
-            <a:picLocks noChangeAspect="1"/>
-          </p:cNvPicPr>
-          <p:nvPr/>
-        </p:nvPicPr>
-        <p:blipFill>
-          <a:blip r:embed="rId7">
-            <a:extLst>
-              <a:ext uri="{28A0092B-C50C-407E-A947-70E740481C1C}">
-                <a14:useLocalDpi xmlns:a14="http://schemas.microsoft.com/office/drawing/2010/main" val="0"/>
-              </a:ext>
-            </a:extLst>
-          </a:blip>
-          <a:stretch>
-            <a:fillRect/>
-          </a:stretch>
-        </p:blipFill>
-        <p:spPr>
-          <a:xfrm>
-            <a:off x="5812747" y="748678"/>
-            <a:ext cx="3105150" cy="1609725"/>
+            <a:off x="6109855" y="2362211"/>
+            <a:ext cx="5841201" cy="3021163"/>
           </a:xfrm>
           <a:prstGeom prst="rect">
             <a:avLst/>
@@ -5375,7 +5748,7 @@
     </p:spTree>
     <p:extLst>
       <p:ext uri="{BB962C8B-B14F-4D97-AF65-F5344CB8AC3E}">
-        <p14:creationId xmlns:p14="http://schemas.microsoft.com/office/powerpoint/2010/main" val="844965899"/>
+        <p14:creationId xmlns:p14="http://schemas.microsoft.com/office/powerpoint/2010/main" val="1744477792"/>
       </p:ext>
     </p:extLst>
   </p:cSld>

</xml_diff>